<commit_message>
still need to make the fight function
</commit_message>
<xml_diff>
--- a/מצגת1.pptx
+++ b/מצגת1.pptx
@@ -247,7 +247,7 @@
           <a:p>
             <a:fld id="{D1C6AD2C-F414-4226-A66F-7AAA5BB7E7C1}" type="datetimeFigureOut">
               <a:rPr lang="en-US" smtClean="0"/>
-              <a:t>6/7/2017</a:t>
+              <a:t>6/10/2017</a:t>
             </a:fld>
             <a:endParaRPr lang="en-US"/>
           </a:p>
@@ -417,7 +417,7 @@
           <a:p>
             <a:fld id="{D1C6AD2C-F414-4226-A66F-7AAA5BB7E7C1}" type="datetimeFigureOut">
               <a:rPr lang="en-US" smtClean="0"/>
-              <a:t>6/7/2017</a:t>
+              <a:t>6/10/2017</a:t>
             </a:fld>
             <a:endParaRPr lang="en-US"/>
           </a:p>
@@ -597,7 +597,7 @@
           <a:p>
             <a:fld id="{D1C6AD2C-F414-4226-A66F-7AAA5BB7E7C1}" type="datetimeFigureOut">
               <a:rPr lang="en-US" smtClean="0"/>
-              <a:t>6/7/2017</a:t>
+              <a:t>6/10/2017</a:t>
             </a:fld>
             <a:endParaRPr lang="en-US"/>
           </a:p>
@@ -767,7 +767,7 @@
           <a:p>
             <a:fld id="{D1C6AD2C-F414-4226-A66F-7AAA5BB7E7C1}" type="datetimeFigureOut">
               <a:rPr lang="en-US" smtClean="0"/>
-              <a:t>6/7/2017</a:t>
+              <a:t>6/10/2017</a:t>
             </a:fld>
             <a:endParaRPr lang="en-US"/>
           </a:p>
@@ -1013,7 +1013,7 @@
           <a:p>
             <a:fld id="{D1C6AD2C-F414-4226-A66F-7AAA5BB7E7C1}" type="datetimeFigureOut">
               <a:rPr lang="en-US" smtClean="0"/>
-              <a:t>6/7/2017</a:t>
+              <a:t>6/10/2017</a:t>
             </a:fld>
             <a:endParaRPr lang="en-US"/>
           </a:p>
@@ -1245,7 +1245,7 @@
           <a:p>
             <a:fld id="{D1C6AD2C-F414-4226-A66F-7AAA5BB7E7C1}" type="datetimeFigureOut">
               <a:rPr lang="en-US" smtClean="0"/>
-              <a:t>6/7/2017</a:t>
+              <a:t>6/10/2017</a:t>
             </a:fld>
             <a:endParaRPr lang="en-US"/>
           </a:p>
@@ -1612,7 +1612,7 @@
           <a:p>
             <a:fld id="{D1C6AD2C-F414-4226-A66F-7AAA5BB7E7C1}" type="datetimeFigureOut">
               <a:rPr lang="en-US" smtClean="0"/>
-              <a:t>6/7/2017</a:t>
+              <a:t>6/10/2017</a:t>
             </a:fld>
             <a:endParaRPr lang="en-US"/>
           </a:p>
@@ -1730,7 +1730,7 @@
           <a:p>
             <a:fld id="{D1C6AD2C-F414-4226-A66F-7AAA5BB7E7C1}" type="datetimeFigureOut">
               <a:rPr lang="en-US" smtClean="0"/>
-              <a:t>6/7/2017</a:t>
+              <a:t>6/10/2017</a:t>
             </a:fld>
             <a:endParaRPr lang="en-US"/>
           </a:p>
@@ -1825,7 +1825,7 @@
           <a:p>
             <a:fld id="{D1C6AD2C-F414-4226-A66F-7AAA5BB7E7C1}" type="datetimeFigureOut">
               <a:rPr lang="en-US" smtClean="0"/>
-              <a:t>6/7/2017</a:t>
+              <a:t>6/10/2017</a:t>
             </a:fld>
             <a:endParaRPr lang="en-US"/>
           </a:p>
@@ -2102,7 +2102,7 @@
           <a:p>
             <a:fld id="{D1C6AD2C-F414-4226-A66F-7AAA5BB7E7C1}" type="datetimeFigureOut">
               <a:rPr lang="en-US" smtClean="0"/>
-              <a:t>6/7/2017</a:t>
+              <a:t>6/10/2017</a:t>
             </a:fld>
             <a:endParaRPr lang="en-US"/>
           </a:p>
@@ -2355,7 +2355,7 @@
           <a:p>
             <a:fld id="{D1C6AD2C-F414-4226-A66F-7AAA5BB7E7C1}" type="datetimeFigureOut">
               <a:rPr lang="en-US" smtClean="0"/>
-              <a:t>6/7/2017</a:t>
+              <a:t>6/10/2017</a:t>
             </a:fld>
             <a:endParaRPr lang="en-US"/>
           </a:p>
@@ -2568,7 +2568,7 @@
           <a:p>
             <a:fld id="{D1C6AD2C-F414-4226-A66F-7AAA5BB7E7C1}" type="datetimeFigureOut">
               <a:rPr lang="en-US" smtClean="0"/>
-              <a:t>6/7/2017</a:t>
+              <a:t>6/10/2017</a:t>
             </a:fld>
             <a:endParaRPr lang="en-US"/>
           </a:p>
@@ -2973,177 +2973,6 @@
           <a:chExt cx="0" cy="0"/>
         </a:xfrm>
       </p:grpSpPr>
-      <p:graphicFrame>
-        <p:nvGraphicFramePr>
-          <p:cNvPr id="4" name="טבלה 3"/>
-          <p:cNvGraphicFramePr>
-            <a:graphicFrameLocks noGrp="1"/>
-          </p:cNvGraphicFramePr>
-          <p:nvPr>
-            <p:extLst>
-              <p:ext uri="{D42A27DB-BD31-4B8C-83A1-F6EECF244321}">
-                <p14:modId xmlns:p14="http://schemas.microsoft.com/office/powerpoint/2010/main" val="3082933344"/>
-              </p:ext>
-            </p:extLst>
-          </p:nvPr>
-        </p:nvGraphicFramePr>
-        <p:xfrm>
-          <a:off x="70450" y="453185"/>
-          <a:ext cx="866851" cy="2748559"/>
-        </p:xfrm>
-        <a:graphic>
-          <a:graphicData uri="http://schemas.openxmlformats.org/drawingml/2006/table">
-            <a:tbl>
-              <a:tblPr firstRow="1" bandRow="1">
-                <a:tableStyleId>{69C7853C-536D-4A76-A0AE-DD22124D55A5}</a:tableStyleId>
-              </a:tblPr>
-              <a:tblGrid>
-                <a:gridCol w="866851">
-                  <a:extLst>
-                    <a:ext uri="{9D8B030D-6E8A-4147-A177-3AD203B41FA5}">
-                      <a16:colId xmlns:a16="http://schemas.microsoft.com/office/drawing/2014/main" val="1885251759"/>
-                    </a:ext>
-                  </a:extLst>
-                </a:gridCol>
-              </a:tblGrid>
-              <a:tr h="534794">
-                <a:tc>
-                  <a:txBody>
-                    <a:bodyPr/>
-                    <a:lstStyle/>
-                    <a:p>
-                      <a:pPr algn="ctr"/>
-                      <a:r>
-                        <a:rPr lang="en-US" sz="1200" dirty="0"/>
-                        <a:t>Union-find (Students)</a:t>
-                      </a:r>
-                    </a:p>
-                  </a:txBody>
-                  <a:tcPr/>
-                </a:tc>
-                <a:extLst>
-                  <a:ext uri="{0D108BD9-81ED-4DB2-BD59-A6C34878D82A}">
-                    <a16:rowId xmlns:a16="http://schemas.microsoft.com/office/drawing/2014/main" val="2293361418"/>
-                  </a:ext>
-                </a:extLst>
-              </a:tr>
-              <a:tr h="320876">
-                <a:tc>
-                  <a:txBody>
-                    <a:bodyPr/>
-                    <a:lstStyle/>
-                    <a:p>
-                      <a:pPr algn="ctr"/>
-                      <a:r>
-                        <a:rPr lang="en-US" sz="1200" dirty="0"/>
-                        <a:t>0</a:t>
-                      </a:r>
-                    </a:p>
-                  </a:txBody>
-                  <a:tcPr/>
-                </a:tc>
-                <a:extLst>
-                  <a:ext uri="{0D108BD9-81ED-4DB2-BD59-A6C34878D82A}">
-                    <a16:rowId xmlns:a16="http://schemas.microsoft.com/office/drawing/2014/main" val="3598875393"/>
-                  </a:ext>
-                </a:extLst>
-              </a:tr>
-              <a:tr h="320876">
-                <a:tc>
-                  <a:txBody>
-                    <a:bodyPr/>
-                    <a:lstStyle/>
-                    <a:p>
-                      <a:pPr algn="ctr"/>
-                      <a:r>
-                        <a:rPr lang="en-US" sz="1200" dirty="0"/>
-                        <a:t>1</a:t>
-                      </a:r>
-                    </a:p>
-                  </a:txBody>
-                  <a:tcPr/>
-                </a:tc>
-                <a:extLst>
-                  <a:ext uri="{0D108BD9-81ED-4DB2-BD59-A6C34878D82A}">
-                    <a16:rowId xmlns:a16="http://schemas.microsoft.com/office/drawing/2014/main" val="3342382287"/>
-                  </a:ext>
-                </a:extLst>
-              </a:tr>
-              <a:tr h="320876">
-                <a:tc>
-                  <a:txBody>
-                    <a:bodyPr/>
-                    <a:lstStyle/>
-                    <a:p>
-                      <a:pPr algn="ctr"/>
-                      <a:r>
-                        <a:rPr lang="en-US" sz="1200" dirty="0"/>
-                        <a:t>2</a:t>
-                      </a:r>
-                    </a:p>
-                  </a:txBody>
-                  <a:tcPr/>
-                </a:tc>
-                <a:extLst>
-                  <a:ext uri="{0D108BD9-81ED-4DB2-BD59-A6C34878D82A}">
-                    <a16:rowId xmlns:a16="http://schemas.microsoft.com/office/drawing/2014/main" val="1955908092"/>
-                  </a:ext>
-                </a:extLst>
-              </a:tr>
-              <a:tr h="930261">
-                <a:tc>
-                  <a:txBody>
-                    <a:bodyPr/>
-                    <a:lstStyle/>
-                    <a:p>
-                      <a:pPr algn="ctr"/>
-                      <a:endParaRPr lang="en-US" sz="1200" dirty="0"/>
-                    </a:p>
-                    <a:p>
-                      <a:pPr algn="ctr"/>
-                      <a:endParaRPr lang="en-US" sz="1200" dirty="0"/>
-                    </a:p>
-                    <a:p>
-                      <a:pPr algn="ctr"/>
-                      <a:r>
-                        <a:rPr lang="en-US" sz="1200" dirty="0"/>
-                        <a:t>….</a:t>
-                      </a:r>
-                    </a:p>
-                  </a:txBody>
-                  <a:tcPr/>
-                </a:tc>
-                <a:extLst>
-                  <a:ext uri="{0D108BD9-81ED-4DB2-BD59-A6C34878D82A}">
-                    <a16:rowId xmlns:a16="http://schemas.microsoft.com/office/drawing/2014/main" val="2207373534"/>
-                  </a:ext>
-                </a:extLst>
-              </a:tr>
-              <a:tr h="320876">
-                <a:tc>
-                  <a:txBody>
-                    <a:bodyPr/>
-                    <a:lstStyle/>
-                    <a:p>
-                      <a:pPr algn="ctr"/>
-                      <a:r>
-                        <a:rPr lang="en-US" sz="1200" dirty="0"/>
-                        <a:t>n-1</a:t>
-                      </a:r>
-                    </a:p>
-                  </a:txBody>
-                  <a:tcPr/>
-                </a:tc>
-                <a:extLst>
-                  <a:ext uri="{0D108BD9-81ED-4DB2-BD59-A6C34878D82A}">
-                    <a16:rowId xmlns:a16="http://schemas.microsoft.com/office/drawing/2014/main" val="805745808"/>
-                  </a:ext>
-                </a:extLst>
-              </a:tr>
-            </a:tbl>
-          </a:graphicData>
-        </a:graphic>
-      </p:graphicFrame>
       <p:grpSp>
         <p:nvGrpSpPr>
           <p:cNvPr id="67" name="קבוצה 66"/>
@@ -3152,7 +2981,7 @@
         </p:nvGrpSpPr>
         <p:grpSpPr>
           <a:xfrm>
-            <a:off x="1552582" y="2346648"/>
+            <a:off x="192851" y="2306981"/>
             <a:ext cx="1517156" cy="1514584"/>
             <a:chOff x="3289461" y="1766570"/>
             <a:chExt cx="2204577" cy="2528557"/>
@@ -3221,7 +3050,7 @@
             <a:p>
               <a:r>
                 <a:rPr lang="en-US" dirty="0"/>
-                <a:t>Team 1</a:t>
+                <a:t>Team 3</a:t>
               </a:r>
             </a:p>
           </p:txBody>
@@ -3737,7 +3566,7 @@
         </p:nvGrpSpPr>
         <p:grpSpPr>
           <a:xfrm>
-            <a:off x="3348005" y="1063118"/>
+            <a:off x="1988274" y="1023451"/>
             <a:ext cx="1517156" cy="1482233"/>
             <a:chOff x="3380014" y="1972265"/>
             <a:chExt cx="2204577" cy="2474549"/>
@@ -3802,7 +3631,7 @@
             <a:p>
               <a:r>
                 <a:rPr lang="en-US" dirty="0"/>
-                <a:t>Team 2</a:t>
+                <a:t>Team 1</a:t>
               </a:r>
             </a:p>
           </p:txBody>
@@ -4310,187 +4139,6 @@
           </p:style>
         </p:cxnSp>
       </p:grpSp>
-      <p:cxnSp>
-        <p:nvCxnSpPr>
-          <p:cNvPr id="101" name="מחבר חץ ישר 100"/>
-          <p:cNvCxnSpPr>
-            <a:cxnSpLocks/>
-            <a:endCxn id="56" idx="1"/>
-          </p:cNvCxnSpPr>
-          <p:nvPr/>
-        </p:nvCxnSpPr>
-        <p:spPr>
-          <a:xfrm>
-            <a:off x="937301" y="1102003"/>
-            <a:ext cx="780748" cy="1773569"/>
-          </a:xfrm>
-          <a:prstGeom prst="straightConnector1">
-            <a:avLst/>
-          </a:prstGeom>
-          <a:ln w="9525">
-            <a:tailEnd type="triangle"/>
-          </a:ln>
-        </p:spPr>
-        <p:style>
-          <a:lnRef idx="1">
-            <a:schemeClr val="dk1"/>
-          </a:lnRef>
-          <a:fillRef idx="0">
-            <a:schemeClr val="dk1"/>
-          </a:fillRef>
-          <a:effectRef idx="0">
-            <a:schemeClr val="dk1"/>
-          </a:effectRef>
-          <a:fontRef idx="minor">
-            <a:schemeClr val="tx1"/>
-          </a:fontRef>
-        </p:style>
-      </p:cxnSp>
-      <p:cxnSp>
-        <p:nvCxnSpPr>
-          <p:cNvPr id="104" name="מחבר חץ ישר 103"/>
-          <p:cNvCxnSpPr>
-            <a:cxnSpLocks/>
-            <a:endCxn id="89" idx="1"/>
-          </p:cNvCxnSpPr>
-          <p:nvPr/>
-        </p:nvCxnSpPr>
-        <p:spPr>
-          <a:xfrm flipV="1">
-            <a:off x="925778" y="1468833"/>
-            <a:ext cx="2525377" cy="49655"/>
-          </a:xfrm>
-          <a:prstGeom prst="straightConnector1">
-            <a:avLst/>
-          </a:prstGeom>
-          <a:ln w="9525">
-            <a:tailEnd type="triangle"/>
-          </a:ln>
-        </p:spPr>
-        <p:style>
-          <a:lnRef idx="1">
-            <a:schemeClr val="dk1"/>
-          </a:lnRef>
-          <a:fillRef idx="0">
-            <a:schemeClr val="dk1"/>
-          </a:fillRef>
-          <a:effectRef idx="0">
-            <a:schemeClr val="dk1"/>
-          </a:effectRef>
-          <a:fontRef idx="minor">
-            <a:schemeClr val="tx1"/>
-          </a:fontRef>
-        </p:style>
-      </p:cxnSp>
-      <p:cxnSp>
-        <p:nvCxnSpPr>
-          <p:cNvPr id="107" name="מחבר חץ ישר 106"/>
-          <p:cNvCxnSpPr>
-            <a:cxnSpLocks/>
-            <a:endCxn id="58" idx="1"/>
-          </p:cNvCxnSpPr>
-          <p:nvPr/>
-        </p:nvCxnSpPr>
-        <p:spPr>
-          <a:xfrm>
-            <a:off x="966061" y="2417365"/>
-            <a:ext cx="1009653" cy="1200381"/>
-          </a:xfrm>
-          <a:prstGeom prst="straightConnector1">
-            <a:avLst/>
-          </a:prstGeom>
-          <a:ln w="9525">
-            <a:tailEnd type="triangle"/>
-          </a:ln>
-        </p:spPr>
-        <p:style>
-          <a:lnRef idx="1">
-            <a:schemeClr val="dk1"/>
-          </a:lnRef>
-          <a:fillRef idx="0">
-            <a:schemeClr val="dk1"/>
-          </a:fillRef>
-          <a:effectRef idx="0">
-            <a:schemeClr val="dk1"/>
-          </a:effectRef>
-          <a:fontRef idx="minor">
-            <a:schemeClr val="tx1"/>
-          </a:fontRef>
-        </p:style>
-      </p:cxnSp>
-      <p:cxnSp>
-        <p:nvCxnSpPr>
-          <p:cNvPr id="109" name="מחבר חץ ישר 108"/>
-          <p:cNvCxnSpPr>
-            <a:cxnSpLocks/>
-            <a:stCxn id="4" idx="3"/>
-            <a:endCxn id="53" idx="1"/>
-          </p:cNvCxnSpPr>
-          <p:nvPr/>
-        </p:nvCxnSpPr>
-        <p:spPr>
-          <a:xfrm>
-            <a:off x="937301" y="1827464"/>
-            <a:ext cx="1360558" cy="807514"/>
-          </a:xfrm>
-          <a:prstGeom prst="straightConnector1">
-            <a:avLst/>
-          </a:prstGeom>
-          <a:ln w="9525">
-            <a:tailEnd type="triangle"/>
-          </a:ln>
-        </p:spPr>
-        <p:style>
-          <a:lnRef idx="1">
-            <a:schemeClr val="dk1"/>
-          </a:lnRef>
-          <a:fillRef idx="0">
-            <a:schemeClr val="dk1"/>
-          </a:fillRef>
-          <a:effectRef idx="0">
-            <a:schemeClr val="dk1"/>
-          </a:effectRef>
-          <a:fontRef idx="minor">
-            <a:schemeClr val="tx1"/>
-          </a:fontRef>
-        </p:style>
-      </p:cxnSp>
-      <p:cxnSp>
-        <p:nvCxnSpPr>
-          <p:cNvPr id="113" name="מחבר חץ ישר 112"/>
-          <p:cNvCxnSpPr>
-            <a:cxnSpLocks/>
-            <a:endCxn id="91" idx="2"/>
-          </p:cNvCxnSpPr>
-          <p:nvPr/>
-        </p:nvCxnSpPr>
-        <p:spPr>
-          <a:xfrm flipV="1">
-            <a:off x="925778" y="2287196"/>
-            <a:ext cx="2745802" cy="658303"/>
-          </a:xfrm>
-          <a:prstGeom prst="straightConnector1">
-            <a:avLst/>
-          </a:prstGeom>
-          <a:ln w="9525">
-            <a:tailEnd type="triangle"/>
-          </a:ln>
-        </p:spPr>
-        <p:style>
-          <a:lnRef idx="1">
-            <a:schemeClr val="dk1"/>
-          </a:lnRef>
-          <a:fillRef idx="0">
-            <a:schemeClr val="dk1"/>
-          </a:fillRef>
-          <a:effectRef idx="0">
-            <a:schemeClr val="dk1"/>
-          </a:effectRef>
-          <a:fontRef idx="minor">
-            <a:schemeClr val="tx1"/>
-          </a:fontRef>
-        </p:style>
-      </p:cxnSp>
       <p:graphicFrame>
         <p:nvGraphicFramePr>
           <p:cNvPr id="117" name="טבלה 116"/>
@@ -4893,7 +4541,7 @@
         </p:nvSpPr>
         <p:spPr>
           <a:xfrm>
-            <a:off x="1420260" y="96886"/>
+            <a:off x="247894" y="277726"/>
             <a:ext cx="1615370" cy="1384995"/>
           </a:xfrm>
           <a:prstGeom prst="rect">
@@ -4941,14 +4589,14 @@
           <p:nvPr>
             <p:extLst>
               <p:ext uri="{D42A27DB-BD31-4B8C-83A1-F6EECF244321}">
-                <p14:modId xmlns:p14="http://schemas.microsoft.com/office/powerpoint/2010/main" val="3331518809"/>
+                <p14:modId xmlns:p14="http://schemas.microsoft.com/office/powerpoint/2010/main" val="2688100561"/>
               </p:ext>
             </p:extLst>
           </p:nvPr>
         </p:nvGraphicFramePr>
         <p:xfrm>
           <a:off x="93417" y="4193493"/>
-          <a:ext cx="3932000" cy="731520"/>
+          <a:ext cx="3932000" cy="548640"/>
         </p:xfrm>
         <a:graphic>
           <a:graphicData uri="http://schemas.openxmlformats.org/drawingml/2006/table">
@@ -5008,10 +4656,9 @@
                     <a:p>
                       <a:pPr algn="ctr"/>
                       <a:r>
-                        <a:rPr lang="en-US" sz="1200" dirty="0" err="1"/>
-                        <a:t>StudentID</a:t>
+                        <a:rPr lang="en-US" sz="1200" dirty="0"/>
+                        <a:t>Team</a:t>
                       </a:r>
-                      <a:endParaRPr lang="en-US" sz="1200" dirty="0"/>
                     </a:p>
                   </a:txBody>
                   <a:tcPr>
@@ -5662,14 +5309,14 @@
           <p:nvPr>
             <p:extLst>
               <p:ext uri="{D42A27DB-BD31-4B8C-83A1-F6EECF244321}">
-                <p14:modId xmlns:p14="http://schemas.microsoft.com/office/powerpoint/2010/main" val="3607968718"/>
+                <p14:modId xmlns:p14="http://schemas.microsoft.com/office/powerpoint/2010/main" val="282065646"/>
               </p:ext>
             </p:extLst>
           </p:nvPr>
         </p:nvGraphicFramePr>
         <p:xfrm>
           <a:off x="5057562" y="3436391"/>
-          <a:ext cx="2894120" cy="1333849"/>
+          <a:ext cx="2894120" cy="1516729"/>
         </p:xfrm>
         <a:graphic>
           <a:graphicData uri="http://schemas.openxmlformats.org/drawingml/2006/table">
@@ -6063,7 +5710,10 @@
                     <a:lstStyle/>
                     <a:p>
                       <a:pPr algn="ctr"/>
-                      <a:endParaRPr lang="en-US" sz="1200" dirty="0"/>
+                      <a:r>
+                        <a:rPr lang="en-US" sz="1200" dirty="0"/>
+                        <a:t>Team’s tree</a:t>
+                      </a:r>
                     </a:p>
                   </a:txBody>
                   <a:tcPr>
@@ -7356,13 +7006,13 @@
           <p:nvPr>
             <p:extLst>
               <p:ext uri="{D42A27DB-BD31-4B8C-83A1-F6EECF244321}">
-                <p14:modId xmlns:p14="http://schemas.microsoft.com/office/powerpoint/2010/main" val="4188053009"/>
+                <p14:modId xmlns:p14="http://schemas.microsoft.com/office/powerpoint/2010/main" val="404141431"/>
               </p:ext>
             </p:extLst>
           </p:nvPr>
         </p:nvGraphicFramePr>
         <p:xfrm>
-          <a:off x="5208622" y="416093"/>
+          <a:off x="3848891" y="376426"/>
           <a:ext cx="706685" cy="2670635"/>
         </p:xfrm>
         <a:graphic>
@@ -7529,8 +7179,8 @@
         </p:nvCxnSpPr>
         <p:spPr>
           <a:xfrm flipH="1" flipV="1">
-            <a:off x="4248013" y="1304428"/>
-            <a:ext cx="960610" cy="316566"/>
+            <a:off x="2888282" y="1264761"/>
+            <a:ext cx="939300" cy="231288"/>
           </a:xfrm>
           <a:prstGeom prst="straightConnector1">
             <a:avLst/>
@@ -7559,14 +7209,14 @@
           <p:cNvPr id="233" name="מחבר חץ ישר 232"/>
           <p:cNvCxnSpPr>
             <a:cxnSpLocks/>
-            <a:endCxn id="53" idx="7"/>
+            <a:endCxn id="59" idx="6"/>
           </p:cNvCxnSpPr>
           <p:nvPr/>
         </p:nvCxnSpPr>
         <p:spPr>
-          <a:xfrm flipH="1" flipV="1">
-            <a:off x="2477667" y="2634978"/>
-            <a:ext cx="2721418" cy="341922"/>
+          <a:xfrm flipH="1">
+            <a:off x="1489465" y="2937233"/>
+            <a:ext cx="2349890" cy="375753"/>
           </a:xfrm>
           <a:prstGeom prst="straightConnector1">
             <a:avLst/>

</xml_diff>

<commit_message>
added scheme to the doc file
</commit_message>
<xml_diff>
--- a/מצגת1.pptx
+++ b/מצגת1.pptx
@@ -247,7 +247,7 @@
           <a:p>
             <a:fld id="{D1C6AD2C-F414-4226-A66F-7AAA5BB7E7C1}" type="datetimeFigureOut">
               <a:rPr lang="en-US" smtClean="0"/>
-              <a:t>6/10/2017</a:t>
+              <a:t>6/11/2017</a:t>
             </a:fld>
             <a:endParaRPr lang="en-US"/>
           </a:p>
@@ -417,7 +417,7 @@
           <a:p>
             <a:fld id="{D1C6AD2C-F414-4226-A66F-7AAA5BB7E7C1}" type="datetimeFigureOut">
               <a:rPr lang="en-US" smtClean="0"/>
-              <a:t>6/10/2017</a:t>
+              <a:t>6/11/2017</a:t>
             </a:fld>
             <a:endParaRPr lang="en-US"/>
           </a:p>
@@ -597,7 +597,7 @@
           <a:p>
             <a:fld id="{D1C6AD2C-F414-4226-A66F-7AAA5BB7E7C1}" type="datetimeFigureOut">
               <a:rPr lang="en-US" smtClean="0"/>
-              <a:t>6/10/2017</a:t>
+              <a:t>6/11/2017</a:t>
             </a:fld>
             <a:endParaRPr lang="en-US"/>
           </a:p>
@@ -767,7 +767,7 @@
           <a:p>
             <a:fld id="{D1C6AD2C-F414-4226-A66F-7AAA5BB7E7C1}" type="datetimeFigureOut">
               <a:rPr lang="en-US" smtClean="0"/>
-              <a:t>6/10/2017</a:t>
+              <a:t>6/11/2017</a:t>
             </a:fld>
             <a:endParaRPr lang="en-US"/>
           </a:p>
@@ -1013,7 +1013,7 @@
           <a:p>
             <a:fld id="{D1C6AD2C-F414-4226-A66F-7AAA5BB7E7C1}" type="datetimeFigureOut">
               <a:rPr lang="en-US" smtClean="0"/>
-              <a:t>6/10/2017</a:t>
+              <a:t>6/11/2017</a:t>
             </a:fld>
             <a:endParaRPr lang="en-US"/>
           </a:p>
@@ -1245,7 +1245,7 @@
           <a:p>
             <a:fld id="{D1C6AD2C-F414-4226-A66F-7AAA5BB7E7C1}" type="datetimeFigureOut">
               <a:rPr lang="en-US" smtClean="0"/>
-              <a:t>6/10/2017</a:t>
+              <a:t>6/11/2017</a:t>
             </a:fld>
             <a:endParaRPr lang="en-US"/>
           </a:p>
@@ -1612,7 +1612,7 @@
           <a:p>
             <a:fld id="{D1C6AD2C-F414-4226-A66F-7AAA5BB7E7C1}" type="datetimeFigureOut">
               <a:rPr lang="en-US" smtClean="0"/>
-              <a:t>6/10/2017</a:t>
+              <a:t>6/11/2017</a:t>
             </a:fld>
             <a:endParaRPr lang="en-US"/>
           </a:p>
@@ -1730,7 +1730,7 @@
           <a:p>
             <a:fld id="{D1C6AD2C-F414-4226-A66F-7AAA5BB7E7C1}" type="datetimeFigureOut">
               <a:rPr lang="en-US" smtClean="0"/>
-              <a:t>6/10/2017</a:t>
+              <a:t>6/11/2017</a:t>
             </a:fld>
             <a:endParaRPr lang="en-US"/>
           </a:p>
@@ -1825,7 +1825,7 @@
           <a:p>
             <a:fld id="{D1C6AD2C-F414-4226-A66F-7AAA5BB7E7C1}" type="datetimeFigureOut">
               <a:rPr lang="en-US" smtClean="0"/>
-              <a:t>6/10/2017</a:t>
+              <a:t>6/11/2017</a:t>
             </a:fld>
             <a:endParaRPr lang="en-US"/>
           </a:p>
@@ -2102,7 +2102,7 @@
           <a:p>
             <a:fld id="{D1C6AD2C-F414-4226-A66F-7AAA5BB7E7C1}" type="datetimeFigureOut">
               <a:rPr lang="en-US" smtClean="0"/>
-              <a:t>6/10/2017</a:t>
+              <a:t>6/11/2017</a:t>
             </a:fld>
             <a:endParaRPr lang="en-US"/>
           </a:p>
@@ -2355,7 +2355,7 @@
           <a:p>
             <a:fld id="{D1C6AD2C-F414-4226-A66F-7AAA5BB7E7C1}" type="datetimeFigureOut">
               <a:rPr lang="en-US" smtClean="0"/>
-              <a:t>6/10/2017</a:t>
+              <a:t>6/11/2017</a:t>
             </a:fld>
             <a:endParaRPr lang="en-US"/>
           </a:p>
@@ -2568,7 +2568,7 @@
           <a:p>
             <a:fld id="{D1C6AD2C-F414-4226-A66F-7AAA5BB7E7C1}" type="datetimeFigureOut">
               <a:rPr lang="en-US" smtClean="0"/>
-              <a:t>6/10/2017</a:t>
+              <a:t>6/11/2017</a:t>
             </a:fld>
             <a:endParaRPr lang="en-US"/>
           </a:p>
@@ -4448,8 +4448,8 @@
         </p:nvSpPr>
         <p:spPr>
           <a:xfrm rot="20027025">
-            <a:off x="8289945" y="1774472"/>
-            <a:ext cx="527709" cy="307777"/>
+            <a:off x="8043795" y="1803950"/>
+            <a:ext cx="944124" cy="307777"/>
           </a:xfrm>
           <a:prstGeom prst="rect">
             <a:avLst/>
@@ -4464,7 +4464,7 @@
           <a:p>
             <a:r>
               <a:rPr lang="en-US" sz="1400" dirty="0"/>
-              <a:t>h(Id)</a:t>
+              <a:t>h(Id)+r(ID)</a:t>
             </a:r>
           </a:p>
         </p:txBody>
@@ -4589,7 +4589,7 @@
           <p:nvPr>
             <p:extLst>
               <p:ext uri="{D42A27DB-BD31-4B8C-83A1-F6EECF244321}">
-                <p14:modId xmlns:p14="http://schemas.microsoft.com/office/powerpoint/2010/main" val="2688100561"/>
+                <p14:modId xmlns:p14="http://schemas.microsoft.com/office/powerpoint/2010/main" val="3845448641"/>
               </p:ext>
             </p:extLst>
           </p:nvPr>
@@ -4797,7 +4797,7 @@
                       <a:pPr algn="ctr"/>
                       <a:r>
                         <a:rPr lang="en-US" sz="1200" dirty="0"/>
-                        <a:t>2</a:t>
+                        <a:t>-</a:t>
                       </a:r>
                     </a:p>
                   </a:txBody>
@@ -4811,7 +4811,7 @@
                       <a:pPr algn="ctr"/>
                       <a:r>
                         <a:rPr lang="en-US" sz="1200" dirty="0"/>
-                        <a:t>10</a:t>
+                        <a:t>4</a:t>
                       </a:r>
                     </a:p>
                   </a:txBody>
@@ -4853,7 +4853,7 @@
                       <a:pPr algn="ctr"/>
                       <a:r>
                         <a:rPr lang="en-US" sz="1200" dirty="0"/>
-                        <a:t>7</a:t>
+                        <a:t>3</a:t>
                       </a:r>
                     </a:p>
                   </a:txBody>
@@ -4951,8 +4951,8 @@
         </p:nvCxnSpPr>
         <p:spPr>
           <a:xfrm>
-            <a:off x="9713822" y="1346258"/>
-            <a:ext cx="261630" cy="0"/>
+            <a:off x="9391707" y="1346258"/>
+            <a:ext cx="583745" cy="0"/>
           </a:xfrm>
           <a:prstGeom prst="straightConnector1">
             <a:avLst/>
@@ -5151,8 +5151,8 @@
         </p:nvCxnSpPr>
         <p:spPr>
           <a:xfrm>
-            <a:off x="9713822" y="3620751"/>
-            <a:ext cx="261630" cy="0"/>
+            <a:off x="9247729" y="3620751"/>
+            <a:ext cx="727723" cy="0"/>
           </a:xfrm>
           <a:prstGeom prst="straightConnector1">
             <a:avLst/>

</xml_diff>